<commit_message>
Add log-scale scaling plots and LOC assets
</commit_message>
<xml_diff>
--- a/benchmark_presentation.pptx
+++ b/benchmark_presentation.pptx
@@ -10,6 +10,15 @@
     <p:sldId id="258" r:id="rId9"/>
     <p:sldId id="259" r:id="rId10"/>
     <p:sldId id="260" r:id="rId11"/>
+    <p:sldId id="261" r:id="rId12"/>
+    <p:sldId id="262" r:id="rId13"/>
+    <p:sldId id="263" r:id="rId14"/>
+    <p:sldId id="264" r:id="rId15"/>
+    <p:sldId id="265" r:id="rId16"/>
+    <p:sldId id="266" r:id="rId17"/>
+    <p:sldId id="267" r:id="rId18"/>
+    <p:sldId id="268" r:id="rId19"/>
+    <p:sldId id="269" r:id="rId20"/>
   </p:sldIdLst>
   <p:sldSz cx="9144000" cy="6858000" type="screen4x3"/>
   <p:notesSz cx="6858000" cy="9144000"/>
@@ -3166,6 +3175,321 @@
 </p:sld>
 </file>
 
+<file path=ppt/slides/slide10.xml><?xml version="1.0" encoding="utf-8"?>
+<p:sld xmlns:a="http://schemas.openxmlformats.org/drawingml/2006/main" xmlns:p="http://schemas.openxmlformats.org/presentationml/2006/main" xmlns:r="http://schemas.openxmlformats.org/officeDocument/2006/relationships">
+  <p:cSld>
+    <p:spTree>
+      <p:nvGrpSpPr>
+        <p:cNvPr id="1" name=""/>
+        <p:cNvGrpSpPr/>
+        <p:nvPr/>
+      </p:nvGrpSpPr>
+      <p:grpSpPr/>
+      <p:sp>
+        <p:nvSpPr>
+          <p:cNvPr id="2" name="Title 1"/>
+          <p:cNvSpPr>
+            <a:spLocks noGrp="1"/>
+          </p:cNvSpPr>
+          <p:nvPr>
+            <p:ph type="title"/>
+          </p:nvPr>
+        </p:nvSpPr>
+        <p:spPr/>
+        <p:txBody>
+          <a:bodyPr/>
+          <a:lstStyle/>
+          <a:p>
+            <a:r>
+              <a:t>MDAnalysis Runtime Scaling</a:t>
+            </a:r>
+          </a:p>
+        </p:txBody>
+      </p:sp>
+      <p:pic>
+        <p:nvPicPr>
+          <p:cNvPr id="3" name="Picture 2" descr="mdanalysis_runtime_scaling.png"/>
+          <p:cNvPicPr>
+            <a:picLocks noChangeAspect="1"/>
+          </p:cNvPicPr>
+          <p:nvPr/>
+        </p:nvPicPr>
+        <p:blipFill>
+          <a:blip r:embed="rId5"/>
+          <a:stretch>
+            <a:fillRect/>
+          </a:stretch>
+        </p:blipFill>
+        <p:spPr>
+          <a:xfrm>
+            <a:off x="365760" y="1097280"/>
+            <a:ext cx="8412480" cy="5201474"/>
+          </a:xfrm>
+          <a:prstGeom prst="rect">
+            <a:avLst/>
+          </a:prstGeom>
+        </p:spPr>
+      </p:pic>
+    </p:spTree>
+  </p:cSld>
+  <p:clrMapOvr>
+    <a:masterClrMapping/>
+  </p:clrMapOvr>
+</p:sld>
+</file>
+
+<file path=ppt/slides/slide11.xml><?xml version="1.0" encoding="utf-8"?>
+<p:sld xmlns:a="http://schemas.openxmlformats.org/drawingml/2006/main" xmlns:p="http://schemas.openxmlformats.org/presentationml/2006/main" xmlns:r="http://schemas.openxmlformats.org/officeDocument/2006/relationships">
+  <p:cSld>
+    <p:spTree>
+      <p:nvGrpSpPr>
+        <p:cNvPr id="1" name=""/>
+        <p:cNvGrpSpPr/>
+        <p:nvPr/>
+      </p:nvGrpSpPr>
+      <p:grpSpPr/>
+      <p:sp>
+        <p:nvSpPr>
+          <p:cNvPr id="2" name="Title 1"/>
+          <p:cNvSpPr>
+            <a:spLocks noGrp="1"/>
+          </p:cNvSpPr>
+          <p:nvPr>
+            <p:ph type="title"/>
+          </p:nvPr>
+        </p:nvSpPr>
+        <p:spPr/>
+        <p:txBody>
+          <a:bodyPr/>
+          <a:lstStyle/>
+          <a:p>
+            <a:r>
+              <a:t>MDAnalysis Memory Scaling</a:t>
+            </a:r>
+          </a:p>
+        </p:txBody>
+      </p:sp>
+      <p:pic>
+        <p:nvPicPr>
+          <p:cNvPr id="3" name="Picture 2" descr="mdanalysis_memory_scaling.png"/>
+          <p:cNvPicPr>
+            <a:picLocks noChangeAspect="1"/>
+          </p:cNvPicPr>
+          <p:nvPr/>
+        </p:nvPicPr>
+        <p:blipFill>
+          <a:blip r:embed="rId5"/>
+          <a:stretch>
+            <a:fillRect/>
+          </a:stretch>
+        </p:blipFill>
+        <p:spPr>
+          <a:xfrm>
+            <a:off x="365760" y="1097280"/>
+            <a:ext cx="8412480" cy="5203669"/>
+          </a:xfrm>
+          <a:prstGeom prst="rect">
+            <a:avLst/>
+          </a:prstGeom>
+        </p:spPr>
+      </p:pic>
+    </p:spTree>
+  </p:cSld>
+  <p:clrMapOvr>
+    <a:masterClrMapping/>
+  </p:clrMapOvr>
+</p:sld>
+</file>
+
+<file path=ppt/slides/slide12.xml><?xml version="1.0" encoding="utf-8"?>
+<p:sld xmlns:a="http://schemas.openxmlformats.org/drawingml/2006/main" xmlns:p="http://schemas.openxmlformats.org/presentationml/2006/main" xmlns:r="http://schemas.openxmlformats.org/officeDocument/2006/relationships">
+  <p:cSld>
+    <p:spTree>
+      <p:nvGrpSpPr>
+        <p:cNvPr id="1" name=""/>
+        <p:cNvGrpSpPr/>
+        <p:nvPr/>
+      </p:nvGrpSpPr>
+      <p:grpSpPr/>
+      <p:sp>
+        <p:nvSpPr>
+          <p:cNvPr id="2" name="Title 1"/>
+          <p:cNvSpPr>
+            <a:spLocks noGrp="1"/>
+          </p:cNvSpPr>
+          <p:nvPr>
+            <p:ph type="title"/>
+          </p:nvPr>
+        </p:nvSpPr>
+        <p:spPr/>
+        <p:txBody>
+          <a:bodyPr/>
+          <a:lstStyle/>
+          <a:p>
+            <a:r>
+              <a:t>Combined Runtime Scaling</a:t>
+            </a:r>
+          </a:p>
+        </p:txBody>
+      </p:sp>
+      <p:pic>
+        <p:nvPicPr>
+          <p:cNvPr id="3" name="Picture 2" descr="combined_runtime_scaling.png"/>
+          <p:cNvPicPr>
+            <a:picLocks noChangeAspect="1"/>
+          </p:cNvPicPr>
+          <p:nvPr/>
+        </p:nvPicPr>
+        <p:blipFill>
+          <a:blip r:embed="rId4"/>
+          <a:stretch>
+            <a:fillRect/>
+          </a:stretch>
+        </p:blipFill>
+        <p:spPr>
+          <a:xfrm>
+            <a:off x="365760" y="1097280"/>
+            <a:ext cx="8412480" cy="5403246"/>
+          </a:xfrm>
+          <a:prstGeom prst="rect">
+            <a:avLst/>
+          </a:prstGeom>
+        </p:spPr>
+      </p:pic>
+    </p:spTree>
+  </p:cSld>
+  <p:clrMapOvr>
+    <a:masterClrMapping/>
+  </p:clrMapOvr>
+</p:sld>
+</file>
+
+<file path=ppt/slides/slide13.xml><?xml version="1.0" encoding="utf-8"?>
+<p:sld xmlns:a="http://schemas.openxmlformats.org/drawingml/2006/main" xmlns:p="http://schemas.openxmlformats.org/presentationml/2006/main" xmlns:r="http://schemas.openxmlformats.org/officeDocument/2006/relationships">
+  <p:cSld>
+    <p:spTree>
+      <p:nvGrpSpPr>
+        <p:cNvPr id="1" name=""/>
+        <p:cNvGrpSpPr/>
+        <p:nvPr/>
+      </p:nvGrpSpPr>
+      <p:grpSpPr/>
+      <p:sp>
+        <p:nvSpPr>
+          <p:cNvPr id="2" name="Title 1"/>
+          <p:cNvSpPr>
+            <a:spLocks noGrp="1"/>
+          </p:cNvSpPr>
+          <p:nvPr>
+            <p:ph type="title"/>
+          </p:nvPr>
+        </p:nvSpPr>
+        <p:spPr/>
+        <p:txBody>
+          <a:bodyPr/>
+          <a:lstStyle/>
+          <a:p>
+            <a:r>
+              <a:t>Combined Memory Scaling</a:t>
+            </a:r>
+          </a:p>
+        </p:txBody>
+      </p:sp>
+      <p:pic>
+        <p:nvPicPr>
+          <p:cNvPr id="3" name="Picture 2" descr="combined_memory_scaling.png"/>
+          <p:cNvPicPr>
+            <a:picLocks noChangeAspect="1"/>
+          </p:cNvPicPr>
+          <p:nvPr/>
+        </p:nvPicPr>
+        <p:blipFill>
+          <a:blip r:embed="rId4"/>
+          <a:stretch>
+            <a:fillRect/>
+          </a:stretch>
+        </p:blipFill>
+        <p:spPr>
+          <a:xfrm>
+            <a:off x="365760" y="1097280"/>
+            <a:ext cx="8412480" cy="5403246"/>
+          </a:xfrm>
+          <a:prstGeom prst="rect">
+            <a:avLst/>
+          </a:prstGeom>
+        </p:spPr>
+      </p:pic>
+    </p:spTree>
+  </p:cSld>
+  <p:clrMapOvr>
+    <a:masterClrMapping/>
+  </p:clrMapOvr>
+</p:sld>
+</file>
+
+<file path=ppt/slides/slide14.xml><?xml version="1.0" encoding="utf-8"?>
+<p:sld xmlns:a="http://schemas.openxmlformats.org/drawingml/2006/main" xmlns:p="http://schemas.openxmlformats.org/presentationml/2006/main" xmlns:r="http://schemas.openxmlformats.org/officeDocument/2006/relationships">
+  <p:cSld>
+    <p:spTree>
+      <p:nvGrpSpPr>
+        <p:cNvPr id="1" name=""/>
+        <p:cNvGrpSpPr/>
+        <p:nvPr/>
+      </p:nvGrpSpPr>
+      <p:grpSpPr/>
+      <p:sp>
+        <p:nvSpPr>
+          <p:cNvPr id="2" name="Title 1"/>
+          <p:cNvSpPr>
+            <a:spLocks noGrp="1"/>
+          </p:cNvSpPr>
+          <p:nvPr>
+            <p:ph type="title"/>
+          </p:nvPr>
+        </p:nvSpPr>
+        <p:spPr/>
+        <p:txBody>
+          <a:bodyPr/>
+          <a:lstStyle/>
+          <a:p>
+            <a:r>
+              <a:t>Lines of Code Comparison</a:t>
+            </a:r>
+          </a:p>
+        </p:txBody>
+      </p:sp>
+      <p:pic>
+        <p:nvPicPr>
+          <p:cNvPr id="3" name="Picture 2" descr="loc_comparison.png"/>
+          <p:cNvPicPr>
+            <a:picLocks noChangeAspect="1"/>
+          </p:cNvPicPr>
+          <p:nvPr/>
+        </p:nvPicPr>
+        <p:blipFill>
+          <a:blip r:embed="rId2"/>
+          <a:stretch>
+            <a:fillRect/>
+          </a:stretch>
+        </p:blipFill>
+        <p:spPr>
+          <a:xfrm>
+            <a:off x="365760" y="1097280"/>
+            <a:ext cx="8412480" cy="6300486"/>
+          </a:xfrm>
+          <a:prstGeom prst="rect">
+            <a:avLst/>
+          </a:prstGeom>
+        </p:spPr>
+      </p:pic>
+    </p:spTree>
+  </p:cSld>
+  <p:clrMapOvr>
+    <a:masterClrMapping/>
+  </p:clrMapOvr>
+</p:sld>
+</file>
+
 <file path=ppt/slides/slide2.xml><?xml version="1.0" encoding="utf-8"?>
 <p:sld xmlns:a="http://schemas.openxmlformats.org/drawingml/2006/main" xmlns:p="http://schemas.openxmlformats.org/presentationml/2006/main" xmlns:r="http://schemas.openxmlformats.org/officeDocument/2006/relationships">
   <p:cSld>
@@ -3740,6 +4064,258 @@
           </a:p>
         </p:txBody>
       </p:sp>
+    </p:spTree>
+  </p:cSld>
+  <p:clrMapOvr>
+    <a:masterClrMapping/>
+  </p:clrMapOvr>
+</p:sld>
+</file>
+
+<file path=ppt/slides/slide6.xml><?xml version="1.0" encoding="utf-8"?>
+<p:sld xmlns:a="http://schemas.openxmlformats.org/drawingml/2006/main" xmlns:p="http://schemas.openxmlformats.org/presentationml/2006/main" xmlns:r="http://schemas.openxmlformats.org/officeDocument/2006/relationships">
+  <p:cSld>
+    <p:spTree>
+      <p:nvGrpSpPr>
+        <p:cNvPr id="1" name=""/>
+        <p:cNvGrpSpPr/>
+        <p:nvPr/>
+      </p:nvGrpSpPr>
+      <p:grpSpPr/>
+      <p:sp>
+        <p:nvSpPr>
+          <p:cNvPr id="2" name="Title 1"/>
+          <p:cNvSpPr>
+            <a:spLocks noGrp="1"/>
+          </p:cNvSpPr>
+          <p:nvPr>
+            <p:ph type="title"/>
+          </p:nvPr>
+        </p:nvSpPr>
+        <p:spPr/>
+        <p:txBody>
+          <a:bodyPr/>
+          <a:lstStyle/>
+          <a:p>
+            <a:r>
+              <a:t>FastMDAnalysis Runtime Scaling</a:t>
+            </a:r>
+          </a:p>
+        </p:txBody>
+      </p:sp>
+      <p:pic>
+        <p:nvPicPr>
+          <p:cNvPr id="3" name="Picture 2" descr="fastmdanalysis_runtime_scaling.png"/>
+          <p:cNvPicPr>
+            <a:picLocks noChangeAspect="1"/>
+          </p:cNvPicPr>
+          <p:nvPr/>
+        </p:nvPicPr>
+        <p:blipFill>
+          <a:blip r:embed="rId5"/>
+          <a:stretch>
+            <a:fillRect/>
+          </a:stretch>
+        </p:blipFill>
+        <p:spPr>
+          <a:xfrm>
+            <a:off x="365760" y="1097280"/>
+            <a:ext cx="8412480" cy="5201474"/>
+          </a:xfrm>
+          <a:prstGeom prst="rect">
+            <a:avLst/>
+          </a:prstGeom>
+        </p:spPr>
+      </p:pic>
+    </p:spTree>
+  </p:cSld>
+  <p:clrMapOvr>
+    <a:masterClrMapping/>
+  </p:clrMapOvr>
+</p:sld>
+</file>
+
+<file path=ppt/slides/slide7.xml><?xml version="1.0" encoding="utf-8"?>
+<p:sld xmlns:a="http://schemas.openxmlformats.org/drawingml/2006/main" xmlns:p="http://schemas.openxmlformats.org/presentationml/2006/main" xmlns:r="http://schemas.openxmlformats.org/officeDocument/2006/relationships">
+  <p:cSld>
+    <p:spTree>
+      <p:nvGrpSpPr>
+        <p:cNvPr id="1" name=""/>
+        <p:cNvGrpSpPr/>
+        <p:nvPr/>
+      </p:nvGrpSpPr>
+      <p:grpSpPr/>
+      <p:sp>
+        <p:nvSpPr>
+          <p:cNvPr id="2" name="Title 1"/>
+          <p:cNvSpPr>
+            <a:spLocks noGrp="1"/>
+          </p:cNvSpPr>
+          <p:nvPr>
+            <p:ph type="title"/>
+          </p:nvPr>
+        </p:nvSpPr>
+        <p:spPr/>
+        <p:txBody>
+          <a:bodyPr/>
+          <a:lstStyle/>
+          <a:p>
+            <a:r>
+              <a:t>FastMDAnalysis Memory Scaling</a:t>
+            </a:r>
+          </a:p>
+        </p:txBody>
+      </p:sp>
+      <p:pic>
+        <p:nvPicPr>
+          <p:cNvPr id="3" name="Picture 2" descr="fastmdanalysis_memory_scaling.png"/>
+          <p:cNvPicPr>
+            <a:picLocks noChangeAspect="1"/>
+          </p:cNvPicPr>
+          <p:nvPr/>
+        </p:nvPicPr>
+        <p:blipFill>
+          <a:blip r:embed="rId5"/>
+          <a:stretch>
+            <a:fillRect/>
+          </a:stretch>
+        </p:blipFill>
+        <p:spPr>
+          <a:xfrm>
+            <a:off x="365760" y="1097280"/>
+            <a:ext cx="8412480" cy="5203669"/>
+          </a:xfrm>
+          <a:prstGeom prst="rect">
+            <a:avLst/>
+          </a:prstGeom>
+        </p:spPr>
+      </p:pic>
+    </p:spTree>
+  </p:cSld>
+  <p:clrMapOvr>
+    <a:masterClrMapping/>
+  </p:clrMapOvr>
+</p:sld>
+</file>
+
+<file path=ppt/slides/slide8.xml><?xml version="1.0" encoding="utf-8"?>
+<p:sld xmlns:a="http://schemas.openxmlformats.org/drawingml/2006/main" xmlns:p="http://schemas.openxmlformats.org/presentationml/2006/main" xmlns:r="http://schemas.openxmlformats.org/officeDocument/2006/relationships">
+  <p:cSld>
+    <p:spTree>
+      <p:nvGrpSpPr>
+        <p:cNvPr id="1" name=""/>
+        <p:cNvGrpSpPr/>
+        <p:nvPr/>
+      </p:nvGrpSpPr>
+      <p:grpSpPr/>
+      <p:sp>
+        <p:nvSpPr>
+          <p:cNvPr id="2" name="Title 1"/>
+          <p:cNvSpPr>
+            <a:spLocks noGrp="1"/>
+          </p:cNvSpPr>
+          <p:nvPr>
+            <p:ph type="title"/>
+          </p:nvPr>
+        </p:nvSpPr>
+        <p:spPr/>
+        <p:txBody>
+          <a:bodyPr/>
+          <a:lstStyle/>
+          <a:p>
+            <a:r>
+              <a:t>MDTraj Runtime Scaling</a:t>
+            </a:r>
+          </a:p>
+        </p:txBody>
+      </p:sp>
+      <p:pic>
+        <p:nvPicPr>
+          <p:cNvPr id="3" name="Picture 2" descr="mdtraj_runtime_scaling.png"/>
+          <p:cNvPicPr>
+            <a:picLocks noChangeAspect="1"/>
+          </p:cNvPicPr>
+          <p:nvPr/>
+        </p:nvPicPr>
+        <p:blipFill>
+          <a:blip r:embed="rId5"/>
+          <a:stretch>
+            <a:fillRect/>
+          </a:stretch>
+        </p:blipFill>
+        <p:spPr>
+          <a:xfrm>
+            <a:off x="365760" y="1097280"/>
+            <a:ext cx="8412480" cy="5203669"/>
+          </a:xfrm>
+          <a:prstGeom prst="rect">
+            <a:avLst/>
+          </a:prstGeom>
+        </p:spPr>
+      </p:pic>
+    </p:spTree>
+  </p:cSld>
+  <p:clrMapOvr>
+    <a:masterClrMapping/>
+  </p:clrMapOvr>
+</p:sld>
+</file>
+
+<file path=ppt/slides/slide9.xml><?xml version="1.0" encoding="utf-8"?>
+<p:sld xmlns:a="http://schemas.openxmlformats.org/drawingml/2006/main" xmlns:p="http://schemas.openxmlformats.org/presentationml/2006/main" xmlns:r="http://schemas.openxmlformats.org/officeDocument/2006/relationships">
+  <p:cSld>
+    <p:spTree>
+      <p:nvGrpSpPr>
+        <p:cNvPr id="1" name=""/>
+        <p:cNvGrpSpPr/>
+        <p:nvPr/>
+      </p:nvGrpSpPr>
+      <p:grpSpPr/>
+      <p:sp>
+        <p:nvSpPr>
+          <p:cNvPr id="2" name="Title 1"/>
+          <p:cNvSpPr>
+            <a:spLocks noGrp="1"/>
+          </p:cNvSpPr>
+          <p:nvPr>
+            <p:ph type="title"/>
+          </p:nvPr>
+        </p:nvSpPr>
+        <p:spPr/>
+        <p:txBody>
+          <a:bodyPr/>
+          <a:lstStyle/>
+          <a:p>
+            <a:r>
+              <a:t>MDTraj Memory Scaling</a:t>
+            </a:r>
+          </a:p>
+        </p:txBody>
+      </p:sp>
+      <p:pic>
+        <p:nvPicPr>
+          <p:cNvPr id="3" name="Picture 2" descr="mdtraj_memory_scaling.png"/>
+          <p:cNvPicPr>
+            <a:picLocks noChangeAspect="1"/>
+          </p:cNvPicPr>
+          <p:nvPr/>
+        </p:nvPicPr>
+        <p:blipFill>
+          <a:blip r:embed="rId5"/>
+          <a:stretch>
+            <a:fillRect/>
+          </a:stretch>
+        </p:blipFill>
+        <p:spPr>
+          <a:xfrm>
+            <a:off x="365760" y="1097280"/>
+            <a:ext cx="8412480" cy="5203669"/>
+          </a:xfrm>
+          <a:prstGeom prst="rect">
+            <a:avLst/>
+          </a:prstGeom>
+        </p:spPr>
+      </p:pic>
     </p:spTree>
   </p:cSld>
   <p:clrMapOvr>

</xml_diff>